<commit_message>
updated initial pipeline notebook
</commit_message>
<xml_diff>
--- a/tutorials.pptx
+++ b/tutorials.pptx
@@ -8,12 +8,13 @@
     <p:sldId id="256" r:id="rId2"/>
     <p:sldId id="261" r:id="rId3"/>
     <p:sldId id="257" r:id="rId4"/>
-    <p:sldId id="258" r:id="rId5"/>
-    <p:sldId id="259" r:id="rId6"/>
-    <p:sldId id="260" r:id="rId7"/>
-    <p:sldId id="262" r:id="rId8"/>
-    <p:sldId id="263" r:id="rId9"/>
-    <p:sldId id="264" r:id="rId10"/>
+    <p:sldId id="262" r:id="rId5"/>
+    <p:sldId id="265" r:id="rId6"/>
+    <p:sldId id="258" r:id="rId7"/>
+    <p:sldId id="259" r:id="rId8"/>
+    <p:sldId id="260" r:id="rId9"/>
+    <p:sldId id="263" r:id="rId10"/>
+    <p:sldId id="264" r:id="rId11"/>
   </p:sldIdLst>
   <p:sldSz cx="12192000" cy="6858000"/>
   <p:notesSz cx="6858000" cy="9144000"/>
@@ -267,7 +268,7 @@
           <a:p>
             <a:fld id="{1A6A7B21-3A70-4FAC-AB22-3D7506ED2D07}" type="datetimeFigureOut">
               <a:rPr lang="he-IL" smtClean="0"/>
-              <a:t>י"ז/אייר/תשע"ח</a:t>
+              <a:t>י"ח/אייר/תשע"ח</a:t>
             </a:fld>
             <a:endParaRPr lang="he-IL"/>
           </a:p>
@@ -465,7 +466,7 @@
           <a:p>
             <a:fld id="{1A6A7B21-3A70-4FAC-AB22-3D7506ED2D07}" type="datetimeFigureOut">
               <a:rPr lang="he-IL" smtClean="0"/>
-              <a:t>י"ז/אייר/תשע"ח</a:t>
+              <a:t>י"ח/אייר/תשע"ח</a:t>
             </a:fld>
             <a:endParaRPr lang="he-IL"/>
           </a:p>
@@ -673,7 +674,7 @@
           <a:p>
             <a:fld id="{1A6A7B21-3A70-4FAC-AB22-3D7506ED2D07}" type="datetimeFigureOut">
               <a:rPr lang="he-IL" smtClean="0"/>
-              <a:t>י"ז/אייר/תשע"ח</a:t>
+              <a:t>י"ח/אייר/תשע"ח</a:t>
             </a:fld>
             <a:endParaRPr lang="he-IL"/>
           </a:p>
@@ -928,7 +929,7 @@
           <a:p>
             <a:fld id="{547EC484-806A-4DDB-A00D-2C23AC465B75}" type="datetimeFigureOut">
               <a:rPr lang="en-US" smtClean="0"/>
-              <a:t>5/2/2018</a:t>
+              <a:t>5/3/2018</a:t>
             </a:fld>
             <a:endParaRPr lang="en-US"/>
           </a:p>
@@ -1136,7 +1137,7 @@
           <a:p>
             <a:fld id="{1A6A7B21-3A70-4FAC-AB22-3D7506ED2D07}" type="datetimeFigureOut">
               <a:rPr lang="he-IL" smtClean="0"/>
-              <a:t>י"ז/אייר/תשע"ח</a:t>
+              <a:t>י"ח/אייר/תשע"ח</a:t>
             </a:fld>
             <a:endParaRPr lang="he-IL"/>
           </a:p>
@@ -1411,7 +1412,7 @@
           <a:p>
             <a:fld id="{1A6A7B21-3A70-4FAC-AB22-3D7506ED2D07}" type="datetimeFigureOut">
               <a:rPr lang="he-IL" smtClean="0"/>
-              <a:t>י"ז/אייר/תשע"ח</a:t>
+              <a:t>י"ח/אייר/תשע"ח</a:t>
             </a:fld>
             <a:endParaRPr lang="he-IL"/>
           </a:p>
@@ -1676,7 +1677,7 @@
           <a:p>
             <a:fld id="{1A6A7B21-3A70-4FAC-AB22-3D7506ED2D07}" type="datetimeFigureOut">
               <a:rPr lang="he-IL" smtClean="0"/>
-              <a:t>י"ז/אייר/תשע"ח</a:t>
+              <a:t>י"ח/אייר/תשע"ח</a:t>
             </a:fld>
             <a:endParaRPr lang="he-IL"/>
           </a:p>
@@ -2088,7 +2089,7 @@
           <a:p>
             <a:fld id="{1A6A7B21-3A70-4FAC-AB22-3D7506ED2D07}" type="datetimeFigureOut">
               <a:rPr lang="he-IL" smtClean="0"/>
-              <a:t>י"ז/אייר/תשע"ח</a:t>
+              <a:t>י"ח/אייר/תשע"ח</a:t>
             </a:fld>
             <a:endParaRPr lang="he-IL"/>
           </a:p>
@@ -2229,7 +2230,7 @@
           <a:p>
             <a:fld id="{1A6A7B21-3A70-4FAC-AB22-3D7506ED2D07}" type="datetimeFigureOut">
               <a:rPr lang="he-IL" smtClean="0"/>
-              <a:t>י"ז/אייר/תשע"ח</a:t>
+              <a:t>י"ח/אייר/תשע"ח</a:t>
             </a:fld>
             <a:endParaRPr lang="he-IL"/>
           </a:p>
@@ -2342,7 +2343,7 @@
           <a:p>
             <a:fld id="{1A6A7B21-3A70-4FAC-AB22-3D7506ED2D07}" type="datetimeFigureOut">
               <a:rPr lang="he-IL" smtClean="0"/>
-              <a:t>י"ז/אייר/תשע"ח</a:t>
+              <a:t>י"ח/אייר/תשע"ח</a:t>
             </a:fld>
             <a:endParaRPr lang="he-IL"/>
           </a:p>
@@ -2653,7 +2654,7 @@
           <a:p>
             <a:fld id="{1A6A7B21-3A70-4FAC-AB22-3D7506ED2D07}" type="datetimeFigureOut">
               <a:rPr lang="he-IL" smtClean="0"/>
-              <a:t>י"ז/אייר/תשע"ח</a:t>
+              <a:t>י"ח/אייר/תשע"ח</a:t>
             </a:fld>
             <a:endParaRPr lang="he-IL"/>
           </a:p>
@@ -2941,7 +2942,7 @@
           <a:p>
             <a:fld id="{1A6A7B21-3A70-4FAC-AB22-3D7506ED2D07}" type="datetimeFigureOut">
               <a:rPr lang="he-IL" smtClean="0"/>
-              <a:t>י"ז/אייר/תשע"ח</a:t>
+              <a:t>י"ח/אייר/תשע"ח</a:t>
             </a:fld>
             <a:endParaRPr lang="he-IL"/>
           </a:p>
@@ -3182,7 +3183,7 @@
           <a:p>
             <a:fld id="{1A6A7B21-3A70-4FAC-AB22-3D7506ED2D07}" type="datetimeFigureOut">
               <a:rPr lang="he-IL" smtClean="0"/>
-              <a:t>י"ז/אייר/תשע"ח</a:t>
+              <a:t>י"ח/אייר/תשע"ח</a:t>
             </a:fld>
             <a:endParaRPr lang="he-IL"/>
           </a:p>
@@ -3656,6 +3657,210 @@
 </p:sld>
 </file>
 
+<file path=ppt/slides/slide10.xml><?xml version="1.0" encoding="utf-8"?>
+<p:sld xmlns:a="http://schemas.openxmlformats.org/drawingml/2006/main" xmlns:r="http://schemas.openxmlformats.org/officeDocument/2006/relationships" xmlns:p="http://schemas.openxmlformats.org/presentationml/2006/main">
+  <p:cSld>
+    <p:spTree>
+      <p:nvGrpSpPr>
+        <p:cNvPr id="1" name=""/>
+        <p:cNvGrpSpPr/>
+        <p:nvPr/>
+      </p:nvGrpSpPr>
+      <p:grpSpPr>
+        <a:xfrm>
+          <a:off x="0" y="0"/>
+          <a:ext cx="0" cy="0"/>
+          <a:chOff x="0" y="0"/>
+          <a:chExt cx="0" cy="0"/>
+        </a:xfrm>
+      </p:grpSpPr>
+      <p:pic>
+        <p:nvPicPr>
+          <p:cNvPr id="6" name="Picture 5">
+            <a:extLst>
+              <a:ext uri="{FF2B5EF4-FFF2-40B4-BE49-F238E27FC236}">
+                <a16:creationId xmlns:a16="http://schemas.microsoft.com/office/drawing/2014/main" id="{8D17072E-C2E3-49A0-95DC-51200ABA6C8B}"/>
+              </a:ext>
+            </a:extLst>
+          </p:cNvPr>
+          <p:cNvPicPr>
+            <a:picLocks noChangeAspect="1"/>
+          </p:cNvPicPr>
+          <p:nvPr/>
+        </p:nvPicPr>
+        <p:blipFill rotWithShape="1">
+          <a:blip r:embed="rId2">
+            <a:extLst>
+              <a:ext uri="{28A0092B-C50C-407E-A947-70E740481C1C}">
+                <a14:useLocalDpi xmlns:a14="http://schemas.microsoft.com/office/drawing/2010/main" val="0"/>
+              </a:ext>
+            </a:extLst>
+          </a:blip>
+          <a:srcRect l="11896" r="16132"/>
+          <a:stretch/>
+        </p:blipFill>
+        <p:spPr>
+          <a:xfrm>
+            <a:off x="280086" y="181046"/>
+            <a:ext cx="3307923" cy="2585324"/>
+          </a:xfrm>
+          <a:prstGeom prst="rect">
+            <a:avLst/>
+          </a:prstGeom>
+        </p:spPr>
+      </p:pic>
+      <p:pic>
+        <p:nvPicPr>
+          <p:cNvPr id="3" name="Picture 2">
+            <a:extLst>
+              <a:ext uri="{FF2B5EF4-FFF2-40B4-BE49-F238E27FC236}">
+                <a16:creationId xmlns:a16="http://schemas.microsoft.com/office/drawing/2014/main" id="{E343B223-CBCB-45BB-816A-C742A11D364A}"/>
+              </a:ext>
+            </a:extLst>
+          </p:cNvPr>
+          <p:cNvPicPr>
+            <a:picLocks noChangeAspect="1"/>
+          </p:cNvPicPr>
+          <p:nvPr/>
+        </p:nvPicPr>
+        <p:blipFill rotWithShape="1">
+          <a:blip r:embed="rId2">
+            <a:extLst>
+              <a:ext uri="{28A0092B-C50C-407E-A947-70E740481C1C}">
+                <a14:useLocalDpi xmlns:a14="http://schemas.microsoft.com/office/drawing/2010/main" val="0"/>
+              </a:ext>
+            </a:extLst>
+          </a:blip>
+          <a:srcRect l="11227" r="15463"/>
+          <a:stretch/>
+        </p:blipFill>
+        <p:spPr>
+          <a:xfrm>
+            <a:off x="8641492" y="3980936"/>
+            <a:ext cx="3369434" cy="2585324"/>
+          </a:xfrm>
+          <a:prstGeom prst="rect">
+            <a:avLst/>
+          </a:prstGeom>
+        </p:spPr>
+      </p:pic>
+      <p:sp>
+        <p:nvSpPr>
+          <p:cNvPr id="2" name="Rectangle 1">
+            <a:extLst>
+              <a:ext uri="{FF2B5EF4-FFF2-40B4-BE49-F238E27FC236}">
+                <a16:creationId xmlns:a16="http://schemas.microsoft.com/office/drawing/2014/main" id="{97300321-B191-48FF-BC00-681AD5552B4A}"/>
+              </a:ext>
+            </a:extLst>
+          </p:cNvPr>
+          <p:cNvSpPr/>
+          <p:nvPr/>
+        </p:nvSpPr>
+        <p:spPr>
+          <a:xfrm>
+            <a:off x="3684002" y="2004532"/>
+            <a:ext cx="5394095" cy="2585323"/>
+          </a:xfrm>
+          <a:prstGeom prst="rect">
+            <a:avLst/>
+          </a:prstGeom>
+          <a:noFill/>
+        </p:spPr>
+        <p:txBody>
+          <a:bodyPr wrap="square" lIns="91440" tIns="45720" rIns="91440" bIns="45720">
+            <a:spAutoFit/>
+          </a:bodyPr>
+          <a:lstStyle/>
+          <a:p>
+            <a:pPr algn="ctr"/>
+            <a:r>
+              <a:rPr lang="en-US" sz="5400" dirty="0">
+                <a:ln w="38100">
+                  <a:solidFill>
+                    <a:srgbClr val="4DA26B"/>
+                  </a:solidFill>
+                </a:ln>
+                <a:solidFill>
+                  <a:srgbClr val="2F874B"/>
+                </a:solidFill>
+                <a:effectLst>
+                  <a:outerShdw blurRad="38100" dist="25400" dir="5400000" algn="ctr" rotWithShape="0">
+                    <a:srgbClr val="6E747A">
+                      <a:alpha val="43000"/>
+                    </a:srgbClr>
+                  </a:outerShdw>
+                </a:effectLst>
+                <a:latin typeface="Aharoni" panose="02010803020104030203" pitchFamily="2" charset="-79"/>
+                <a:cs typeface="Aharoni" panose="02010803020104030203" pitchFamily="2" charset="-79"/>
+              </a:rPr>
+              <a:t>Good luck</a:t>
+            </a:r>
+          </a:p>
+          <a:p>
+            <a:pPr algn="ctr"/>
+            <a:r>
+              <a:rPr lang="en-US" sz="5400" dirty="0">
+                <a:ln w="38100">
+                  <a:solidFill>
+                    <a:srgbClr val="4DA26B"/>
+                  </a:solidFill>
+                </a:ln>
+                <a:solidFill>
+                  <a:srgbClr val="2F874B"/>
+                </a:solidFill>
+                <a:effectLst>
+                  <a:outerShdw blurRad="38100" dist="25400" dir="5400000" algn="ctr" rotWithShape="0">
+                    <a:srgbClr val="6E747A">
+                      <a:alpha val="43000"/>
+                    </a:srgbClr>
+                  </a:outerShdw>
+                </a:effectLst>
+                <a:latin typeface="Aharoni" panose="02010803020104030203" pitchFamily="2" charset="-79"/>
+                <a:cs typeface="Aharoni" panose="02010803020104030203" pitchFamily="2" charset="-79"/>
+              </a:rPr>
+              <a:t>&amp; </a:t>
+            </a:r>
+          </a:p>
+          <a:p>
+            <a:pPr algn="ctr"/>
+            <a:r>
+              <a:rPr lang="en-US" sz="5400" dirty="0">
+                <a:ln w="38100">
+                  <a:solidFill>
+                    <a:srgbClr val="4DA26B"/>
+                  </a:solidFill>
+                </a:ln>
+                <a:solidFill>
+                  <a:srgbClr val="2F874B"/>
+                </a:solidFill>
+                <a:effectLst>
+                  <a:outerShdw blurRad="38100" dist="25400" dir="5400000" algn="ctr" rotWithShape="0">
+                    <a:srgbClr val="6E747A">
+                      <a:alpha val="43000"/>
+                    </a:srgbClr>
+                  </a:outerShdw>
+                </a:effectLst>
+                <a:latin typeface="Aharoni" panose="02010803020104030203" pitchFamily="2" charset="-79"/>
+                <a:cs typeface="Aharoni" panose="02010803020104030203" pitchFamily="2" charset="-79"/>
+              </a:rPr>
+              <a:t>have fun!</a:t>
+            </a:r>
+          </a:p>
+        </p:txBody>
+      </p:sp>
+    </p:spTree>
+    <p:extLst>
+      <p:ext uri="{BB962C8B-B14F-4D97-AF65-F5344CB8AC3E}">
+        <p14:creationId xmlns:p14="http://schemas.microsoft.com/office/powerpoint/2010/main" val="2702283830"/>
+      </p:ext>
+    </p:extLst>
+  </p:cSld>
+  <p:clrMapOvr>
+    <a:masterClrMapping/>
+  </p:clrMapOvr>
+</p:sld>
+</file>
+
 <file path=ppt/slides/slide2.xml><?xml version="1.0" encoding="utf-8"?>
 <p:sld xmlns:a="http://schemas.openxmlformats.org/drawingml/2006/main" xmlns:r="http://schemas.openxmlformats.org/officeDocument/2006/relationships" xmlns:p="http://schemas.openxmlformats.org/presentationml/2006/main">
   <p:cSld>
@@ -4221,10 +4426,10 @@
           <a:p>
             <a:pPr algn="ctr"/>
             <a:r>
-              <a:rPr lang="en-US" dirty="0"/>
-              <a:t>DMBI Data Hackathon</a:t>
-            </a:r>
-            <a:endParaRPr lang="he-IL" dirty="0"/>
+              <a:rPr lang="en-US" sz="3600" b="1" dirty="0"/>
+              <a:t>DMBI Data Hackathon – tutorial sessions</a:t>
+            </a:r>
+            <a:endParaRPr lang="he-IL" sz="3600" b="1" dirty="0"/>
           </a:p>
         </p:txBody>
       </p:sp>
@@ -4561,6 +4766,614 @@
 </file>
 
 <file path=ppt/slides/slide4.xml><?xml version="1.0" encoding="utf-8"?>
+<p:sld xmlns:a="http://schemas.openxmlformats.org/drawingml/2006/main" xmlns:r="http://schemas.openxmlformats.org/officeDocument/2006/relationships" xmlns:p="http://schemas.openxmlformats.org/presentationml/2006/main">
+  <p:cSld>
+    <p:spTree>
+      <p:nvGrpSpPr>
+        <p:cNvPr id="1" name=""/>
+        <p:cNvGrpSpPr/>
+        <p:nvPr/>
+      </p:nvGrpSpPr>
+      <p:grpSpPr>
+        <a:xfrm>
+          <a:off x="0" y="0"/>
+          <a:ext cx="0" cy="0"/>
+          <a:chOff x="0" y="0"/>
+          <a:chExt cx="0" cy="0"/>
+        </a:xfrm>
+      </p:grpSpPr>
+      <p:sp>
+        <p:nvSpPr>
+          <p:cNvPr id="2" name="כותרת 1">
+            <a:extLst>
+              <a:ext uri="{FF2B5EF4-FFF2-40B4-BE49-F238E27FC236}">
+                <a16:creationId xmlns:a16="http://schemas.microsoft.com/office/drawing/2014/main" id="{0697D4F4-F50F-4B8B-8F8B-AAB9182CDCF8}"/>
+              </a:ext>
+            </a:extLst>
+          </p:cNvPr>
+          <p:cNvSpPr>
+            <a:spLocks noGrp="1"/>
+          </p:cNvSpPr>
+          <p:nvPr>
+            <p:ph type="title"/>
+          </p:nvPr>
+        </p:nvSpPr>
+        <p:spPr/>
+        <p:txBody>
+          <a:bodyPr vert="horz" lIns="91440" tIns="45720" rIns="91440" bIns="45720" rtlCol="1" anchor="ctr">
+            <a:normAutofit/>
+          </a:bodyPr>
+          <a:lstStyle/>
+          <a:p>
+            <a:pPr algn="ctr"/>
+            <a:r>
+              <a:rPr lang="en-US" dirty="0"/>
+              <a:t>DMBI Data Hackathon - timeline</a:t>
+            </a:r>
+            <a:endParaRPr lang="he-IL" dirty="0"/>
+          </a:p>
+        </p:txBody>
+      </p:sp>
+      <p:pic>
+        <p:nvPicPr>
+          <p:cNvPr id="6" name="Picture 5">
+            <a:extLst>
+              <a:ext uri="{FF2B5EF4-FFF2-40B4-BE49-F238E27FC236}">
+                <a16:creationId xmlns:a16="http://schemas.microsoft.com/office/drawing/2014/main" id="{F6C8768B-75C6-4862-BD41-955D3EED206B}"/>
+              </a:ext>
+            </a:extLst>
+          </p:cNvPr>
+          <p:cNvPicPr>
+            <a:picLocks noChangeAspect="1"/>
+          </p:cNvPicPr>
+          <p:nvPr/>
+        </p:nvPicPr>
+        <p:blipFill rotWithShape="1">
+          <a:blip r:embed="rId2">
+            <a:extLst>
+              <a:ext uri="{28A0092B-C50C-407E-A947-70E740481C1C}">
+                <a14:useLocalDpi xmlns:a14="http://schemas.microsoft.com/office/drawing/2010/main" val="0"/>
+              </a:ext>
+            </a:extLst>
+          </a:blip>
+          <a:srcRect/>
+          <a:stretch/>
+        </p:blipFill>
+        <p:spPr>
+          <a:xfrm>
+            <a:off x="193964" y="230188"/>
+            <a:ext cx="2105889" cy="1184563"/>
+          </a:xfrm>
+          <a:prstGeom prst="rect">
+            <a:avLst/>
+          </a:prstGeom>
+        </p:spPr>
+      </p:pic>
+      <p:pic>
+        <p:nvPicPr>
+          <p:cNvPr id="7" name="Picture 2" descr="Image result for bgu">
+            <a:extLst>
+              <a:ext uri="{FF2B5EF4-FFF2-40B4-BE49-F238E27FC236}">
+                <a16:creationId xmlns:a16="http://schemas.microsoft.com/office/drawing/2014/main" id="{90848CA4-C583-40E9-8976-C26F6CA508BB}"/>
+              </a:ext>
+            </a:extLst>
+          </p:cNvPr>
+          <p:cNvPicPr>
+            <a:picLocks noChangeAspect="1" noChangeArrowheads="1"/>
+          </p:cNvPicPr>
+          <p:nvPr/>
+        </p:nvPicPr>
+        <p:blipFill>
+          <a:blip r:embed="rId3" cstate="print">
+            <a:extLst>
+              <a:ext uri="{28A0092B-C50C-407E-A947-70E740481C1C}">
+                <a14:useLocalDpi xmlns:a14="http://schemas.microsoft.com/office/drawing/2010/main" val="0"/>
+              </a:ext>
+            </a:extLst>
+          </a:blip>
+          <a:srcRect/>
+          <a:stretch>
+            <a:fillRect/>
+          </a:stretch>
+        </p:blipFill>
+        <p:spPr bwMode="auto">
+          <a:xfrm>
+            <a:off x="10526685" y="86793"/>
+            <a:ext cx="1471351" cy="1471351"/>
+          </a:xfrm>
+          <a:prstGeom prst="rect">
+            <a:avLst/>
+          </a:prstGeom>
+          <a:noFill/>
+          <a:extLst>
+            <a:ext uri="{909E8E84-426E-40DD-AFC4-6F175D3DCCD1}">
+              <a14:hiddenFill xmlns:a14="http://schemas.microsoft.com/office/drawing/2010/main">
+                <a:solidFill>
+                  <a:srgbClr val="FFFFFF"/>
+                </a:solidFill>
+              </a14:hiddenFill>
+            </a:ext>
+          </a:extLst>
+        </p:spPr>
+      </p:pic>
+      <p:sp>
+        <p:nvSpPr>
+          <p:cNvPr id="5" name="Content Placeholder 4">
+            <a:extLst>
+              <a:ext uri="{FF2B5EF4-FFF2-40B4-BE49-F238E27FC236}">
+                <a16:creationId xmlns:a16="http://schemas.microsoft.com/office/drawing/2014/main" id="{E4C2BB1C-D729-48F2-B91A-CD3A1F94B173}"/>
+              </a:ext>
+            </a:extLst>
+          </p:cNvPr>
+          <p:cNvSpPr>
+            <a:spLocks noGrp="1"/>
+          </p:cNvSpPr>
+          <p:nvPr>
+            <p:ph idx="1"/>
+          </p:nvPr>
+        </p:nvSpPr>
+        <p:spPr>
+          <a:xfrm>
+            <a:off x="442785" y="1825625"/>
+            <a:ext cx="5397842" cy="4351338"/>
+          </a:xfrm>
+        </p:spPr>
+        <p:txBody>
+          <a:bodyPr>
+            <a:normAutofit lnSpcReduction="10000"/>
+          </a:bodyPr>
+          <a:lstStyle/>
+          <a:p>
+            <a:pPr algn="l" rtl="0" fontAlgn="base"/>
+            <a:r>
+              <a:rPr lang="en-US" sz="2000" b="1" dirty="0"/>
+              <a:t>Day 1, 3/5:</a:t>
+            </a:r>
+            <a:r>
+              <a:rPr lang="en-US" sz="2000" dirty="0"/>
+              <a:t> </a:t>
+            </a:r>
+          </a:p>
+          <a:p>
+            <a:pPr algn="l" rtl="0" fontAlgn="base"/>
+            <a:r>
+              <a:rPr lang="en-US" sz="2000" dirty="0"/>
+              <a:t>9:00 - Arrival and light breakfast</a:t>
+            </a:r>
+          </a:p>
+          <a:p>
+            <a:pPr algn="l" rtl="0" fontAlgn="base"/>
+            <a:r>
+              <a:rPr lang="en-US" sz="2000" dirty="0"/>
+              <a:t>9:45 - Hackathon starts! Challenges overview</a:t>
+            </a:r>
+          </a:p>
+          <a:p>
+            <a:pPr algn="l" rtl="0" fontAlgn="base"/>
+            <a:r>
+              <a:rPr lang="en-US" sz="2000" dirty="0"/>
+              <a:t>12:00 - Tutorial - "an Introductory Tutorial on Embeddings with TensorFlow" by </a:t>
+            </a:r>
+            <a:r>
+              <a:rPr lang="en-US" sz="2000" dirty="0">
+                <a:hlinkClick r:id="rId4"/>
+              </a:rPr>
+              <a:t>Taboola</a:t>
+            </a:r>
+            <a:endParaRPr lang="en-US" sz="2000" dirty="0"/>
+          </a:p>
+          <a:p>
+            <a:pPr algn="l" rtl="0" fontAlgn="base"/>
+            <a:r>
+              <a:rPr lang="en-US" sz="2000" dirty="0"/>
+              <a:t>14:00 - Lunch</a:t>
+            </a:r>
+          </a:p>
+          <a:p>
+            <a:pPr algn="l" rtl="0" fontAlgn="base"/>
+            <a:r>
+              <a:rPr lang="en-US" sz="2000" dirty="0"/>
+              <a:t>16:00 - Tutorial - "Advanced </a:t>
+            </a:r>
+            <a:r>
+              <a:rPr lang="en-US" sz="2000" dirty="0" err="1"/>
+              <a:t>Keras</a:t>
+            </a:r>
+            <a:r>
+              <a:rPr lang="en-US" sz="2000" dirty="0"/>
+              <a:t> Applications" by </a:t>
+            </a:r>
+            <a:r>
+              <a:rPr lang="en-US" sz="2000" dirty="0">
+                <a:hlinkClick r:id="rId4"/>
+              </a:rPr>
+              <a:t>Yam Peleg</a:t>
+            </a:r>
+            <a:endParaRPr lang="en-US" sz="2000" dirty="0"/>
+          </a:p>
+          <a:p>
+            <a:pPr algn="l" rtl="0" fontAlgn="base"/>
+            <a:r>
+              <a:rPr lang="en-US" sz="2000" dirty="0"/>
+              <a:t>19:00 - Tutorial -  "Interpretability of Machine Learning Models" by  </a:t>
+            </a:r>
+            <a:r>
+              <a:rPr lang="en-US" sz="2000" dirty="0">
+                <a:hlinkClick r:id="rId4"/>
+              </a:rPr>
+              <a:t>Michaël </a:t>
+            </a:r>
+            <a:r>
+              <a:rPr lang="en-US" sz="2000" dirty="0" err="1">
+                <a:hlinkClick r:id="rId4"/>
+              </a:rPr>
+              <a:t>Mariën</a:t>
+            </a:r>
+            <a:r>
+              <a:rPr lang="en-US" sz="2000" dirty="0"/>
+              <a:t> from KBC</a:t>
+            </a:r>
+          </a:p>
+          <a:p>
+            <a:pPr algn="l" rtl="0" fontAlgn="base"/>
+            <a:r>
+              <a:rPr lang="en-US" sz="2000" dirty="0"/>
+              <a:t>20:30 - Dinner</a:t>
+            </a:r>
+          </a:p>
+          <a:p>
+            <a:pPr algn="l" rtl="0" fontAlgn="base"/>
+            <a:r>
+              <a:rPr lang="en-US" sz="2000" dirty="0"/>
+              <a:t>21:30 - Stretches and Body Relaxation</a:t>
+            </a:r>
+          </a:p>
+          <a:p>
+            <a:pPr marL="0" indent="0" algn="l" rtl="0" fontAlgn="base">
+              <a:buNone/>
+            </a:pPr>
+            <a:endParaRPr lang="en-US" sz="2000" dirty="0"/>
+          </a:p>
+        </p:txBody>
+      </p:sp>
+      <p:sp>
+        <p:nvSpPr>
+          <p:cNvPr id="8" name="Rectangle 7">
+            <a:extLst>
+              <a:ext uri="{FF2B5EF4-FFF2-40B4-BE49-F238E27FC236}">
+                <a16:creationId xmlns:a16="http://schemas.microsoft.com/office/drawing/2014/main" id="{A88DC748-F668-4AFA-BD7B-6B26A14DA3E1}"/>
+              </a:ext>
+            </a:extLst>
+          </p:cNvPr>
+          <p:cNvSpPr/>
+          <p:nvPr/>
+        </p:nvSpPr>
+        <p:spPr>
+          <a:xfrm>
+            <a:off x="6433751" y="1825625"/>
+            <a:ext cx="6096000" cy="2308324"/>
+          </a:xfrm>
+          <a:prstGeom prst="rect">
+            <a:avLst/>
+          </a:prstGeom>
+        </p:spPr>
+        <p:txBody>
+          <a:bodyPr>
+            <a:spAutoFit/>
+          </a:bodyPr>
+          <a:lstStyle/>
+          <a:p>
+            <a:pPr algn="l" rtl="0" fontAlgn="base"/>
+            <a:r>
+              <a:rPr lang="en-US" b="1" dirty="0"/>
+              <a:t>Day 2, 4/5:</a:t>
+            </a:r>
+            <a:endParaRPr lang="en-US" dirty="0"/>
+          </a:p>
+          <a:p>
+            <a:pPr algn="l" rtl="0" fontAlgn="base"/>
+            <a:r>
+              <a:rPr lang="en-US" dirty="0"/>
+              <a:t>00:00 - Night snacks</a:t>
+            </a:r>
+          </a:p>
+          <a:p>
+            <a:pPr algn="l" rtl="0" fontAlgn="base"/>
+            <a:r>
+              <a:rPr lang="en-US" dirty="0"/>
+              <a:t>6:30 - Test sets are given</a:t>
+            </a:r>
+          </a:p>
+          <a:p>
+            <a:pPr algn="l" rtl="0" fontAlgn="base"/>
+            <a:r>
+              <a:rPr lang="en-US" dirty="0"/>
+              <a:t>7:00 - Breakfast</a:t>
+            </a:r>
+          </a:p>
+          <a:p>
+            <a:pPr algn="l" rtl="0" fontAlgn="base"/>
+            <a:r>
+              <a:rPr lang="en-US" dirty="0"/>
+              <a:t>9:00 - First judging round</a:t>
+            </a:r>
+          </a:p>
+          <a:p>
+            <a:pPr algn="l" rtl="0" fontAlgn="base"/>
+            <a:r>
+              <a:rPr lang="en-US" dirty="0"/>
+              <a:t>11:30 - Presentation and second judging round</a:t>
+            </a:r>
+          </a:p>
+          <a:p>
+            <a:pPr algn="l" rtl="0" fontAlgn="base"/>
+            <a:r>
+              <a:rPr lang="en-US" dirty="0"/>
+              <a:t>12:30 – winners announced </a:t>
+            </a:r>
+          </a:p>
+          <a:p>
+            <a:pPr algn="l" rtl="0" fontAlgn="base"/>
+            <a:r>
+              <a:rPr lang="en-US" dirty="0"/>
+              <a:t>13:00 - Hackathon ends!</a:t>
+            </a:r>
+          </a:p>
+        </p:txBody>
+      </p:sp>
+      <p:sp>
+        <p:nvSpPr>
+          <p:cNvPr id="12" name="Rectangle 11">
+            <a:extLst>
+              <a:ext uri="{FF2B5EF4-FFF2-40B4-BE49-F238E27FC236}">
+                <a16:creationId xmlns:a16="http://schemas.microsoft.com/office/drawing/2014/main" id="{7CB913EE-D151-4A9A-9025-BBCAB9F2583B}"/>
+              </a:ext>
+            </a:extLst>
+          </p:cNvPr>
+          <p:cNvSpPr/>
+          <p:nvPr/>
+        </p:nvSpPr>
+        <p:spPr>
+          <a:xfrm>
+            <a:off x="6433751" y="4259203"/>
+            <a:ext cx="5198076" cy="2308324"/>
+          </a:xfrm>
+          <a:prstGeom prst="rect">
+            <a:avLst/>
+          </a:prstGeom>
+        </p:spPr>
+        <p:txBody>
+          <a:bodyPr wrap="square">
+            <a:spAutoFit/>
+          </a:bodyPr>
+          <a:lstStyle/>
+          <a:p>
+            <a:pPr algn="l" rtl="0" fontAlgn="base"/>
+            <a:r>
+              <a:rPr lang="en-US" b="1" dirty="0"/>
+              <a:t>Things to remember:</a:t>
+            </a:r>
+          </a:p>
+          <a:p>
+            <a:pPr marL="285750" indent="-285750" algn="l" rtl="0" fontAlgn="base">
+              <a:buFont typeface="Arial" panose="020B0604020202020204" pitchFamily="34" charset="0"/>
+              <a:buChar char="•"/>
+            </a:pPr>
+            <a:r>
+              <a:rPr lang="en-US" dirty="0"/>
+              <a:t>Prepare a presentation that describes your work for judging rounds</a:t>
+            </a:r>
+          </a:p>
+          <a:p>
+            <a:pPr marL="285750" indent="-285750" algn="l" rtl="0" fontAlgn="base">
+              <a:buFont typeface="Arial" panose="020B0604020202020204" pitchFamily="34" charset="0"/>
+              <a:buChar char="•"/>
+            </a:pPr>
+            <a:r>
+              <a:rPr lang="en-US" dirty="0"/>
+              <a:t>Solutions are scored:</a:t>
+            </a:r>
+          </a:p>
+          <a:p>
+            <a:pPr marL="742950" lvl="1" indent="-285750" algn="l" rtl="0" fontAlgn="base">
+              <a:buFont typeface="Wingdings" panose="05000000000000000000" pitchFamily="2" charset="2"/>
+              <a:buChar char="§"/>
+            </a:pPr>
+            <a:r>
+              <a:rPr lang="en-US" dirty="0"/>
+              <a:t>60% metric optimization</a:t>
+            </a:r>
+          </a:p>
+          <a:p>
+            <a:pPr marL="742950" lvl="1" indent="-285750" algn="l" rtl="0" fontAlgn="base">
+              <a:buFont typeface="Wingdings" panose="05000000000000000000" pitchFamily="2" charset="2"/>
+              <a:buChar char="§"/>
+            </a:pPr>
+            <a:r>
+              <a:rPr lang="en-US" dirty="0"/>
+              <a:t>30% creativity and innovation</a:t>
+            </a:r>
+          </a:p>
+          <a:p>
+            <a:pPr marL="742950" lvl="1" indent="-285750" algn="l" rtl="0" fontAlgn="base">
+              <a:buFont typeface="Wingdings" panose="05000000000000000000" pitchFamily="2" charset="2"/>
+              <a:buChar char="§"/>
+            </a:pPr>
+            <a:r>
+              <a:rPr lang="en-US" dirty="0"/>
+              <a:t>10% special insights to the data (even if not effecting selected metric)</a:t>
+            </a:r>
+          </a:p>
+        </p:txBody>
+      </p:sp>
+    </p:spTree>
+    <p:extLst>
+      <p:ext uri="{BB962C8B-B14F-4D97-AF65-F5344CB8AC3E}">
+        <p14:creationId xmlns:p14="http://schemas.microsoft.com/office/powerpoint/2010/main" val="1809144969"/>
+      </p:ext>
+    </p:extLst>
+  </p:cSld>
+  <p:clrMapOvr>
+    <a:masterClrMapping/>
+  </p:clrMapOvr>
+</p:sld>
+</file>
+
+<file path=ppt/slides/slide5.xml><?xml version="1.0" encoding="utf-8"?>
+<p:sld xmlns:a="http://schemas.openxmlformats.org/drawingml/2006/main" xmlns:r="http://schemas.openxmlformats.org/officeDocument/2006/relationships" xmlns:p="http://schemas.openxmlformats.org/presentationml/2006/main">
+  <p:cSld>
+    <p:spTree>
+      <p:nvGrpSpPr>
+        <p:cNvPr id="1" name=""/>
+        <p:cNvGrpSpPr/>
+        <p:nvPr/>
+      </p:nvGrpSpPr>
+      <p:grpSpPr>
+        <a:xfrm>
+          <a:off x="0" y="0"/>
+          <a:ext cx="0" cy="0"/>
+          <a:chOff x="0" y="0"/>
+          <a:chExt cx="0" cy="0"/>
+        </a:xfrm>
+      </p:grpSpPr>
+      <p:pic>
+        <p:nvPicPr>
+          <p:cNvPr id="6" name="Picture 5">
+            <a:extLst>
+              <a:ext uri="{FF2B5EF4-FFF2-40B4-BE49-F238E27FC236}">
+                <a16:creationId xmlns:a16="http://schemas.microsoft.com/office/drawing/2014/main" id="{8D17072E-C2E3-49A0-95DC-51200ABA6C8B}"/>
+              </a:ext>
+            </a:extLst>
+          </p:cNvPr>
+          <p:cNvPicPr>
+            <a:picLocks noChangeAspect="1"/>
+          </p:cNvPicPr>
+          <p:nvPr/>
+        </p:nvPicPr>
+        <p:blipFill rotWithShape="1">
+          <a:blip r:embed="rId2">
+            <a:extLst>
+              <a:ext uri="{28A0092B-C50C-407E-A947-70E740481C1C}">
+                <a14:useLocalDpi xmlns:a14="http://schemas.microsoft.com/office/drawing/2010/main" val="0"/>
+              </a:ext>
+            </a:extLst>
+          </a:blip>
+          <a:srcRect l="11896" r="16132"/>
+          <a:stretch/>
+        </p:blipFill>
+        <p:spPr>
+          <a:xfrm>
+            <a:off x="280086" y="181046"/>
+            <a:ext cx="3307923" cy="2585324"/>
+          </a:xfrm>
+          <a:prstGeom prst="rect">
+            <a:avLst/>
+          </a:prstGeom>
+        </p:spPr>
+      </p:pic>
+      <p:pic>
+        <p:nvPicPr>
+          <p:cNvPr id="3" name="Picture 2">
+            <a:extLst>
+              <a:ext uri="{FF2B5EF4-FFF2-40B4-BE49-F238E27FC236}">
+                <a16:creationId xmlns:a16="http://schemas.microsoft.com/office/drawing/2014/main" id="{E343B223-CBCB-45BB-816A-C742A11D364A}"/>
+              </a:ext>
+            </a:extLst>
+          </p:cNvPr>
+          <p:cNvPicPr>
+            <a:picLocks noChangeAspect="1"/>
+          </p:cNvPicPr>
+          <p:nvPr/>
+        </p:nvPicPr>
+        <p:blipFill rotWithShape="1">
+          <a:blip r:embed="rId2">
+            <a:extLst>
+              <a:ext uri="{28A0092B-C50C-407E-A947-70E740481C1C}">
+                <a14:useLocalDpi xmlns:a14="http://schemas.microsoft.com/office/drawing/2010/main" val="0"/>
+              </a:ext>
+            </a:extLst>
+          </a:blip>
+          <a:srcRect l="11227" r="15463"/>
+          <a:stretch/>
+        </p:blipFill>
+        <p:spPr>
+          <a:xfrm>
+            <a:off x="8641492" y="3980936"/>
+            <a:ext cx="3369434" cy="2585324"/>
+          </a:xfrm>
+          <a:prstGeom prst="rect">
+            <a:avLst/>
+          </a:prstGeom>
+        </p:spPr>
+      </p:pic>
+      <p:sp>
+        <p:nvSpPr>
+          <p:cNvPr id="2" name="Rectangle 1">
+            <a:extLst>
+              <a:ext uri="{FF2B5EF4-FFF2-40B4-BE49-F238E27FC236}">
+                <a16:creationId xmlns:a16="http://schemas.microsoft.com/office/drawing/2014/main" id="{97300321-B191-48FF-BC00-681AD5552B4A}"/>
+              </a:ext>
+            </a:extLst>
+          </p:cNvPr>
+          <p:cNvSpPr/>
+          <p:nvPr/>
+        </p:nvSpPr>
+        <p:spPr>
+          <a:xfrm>
+            <a:off x="3889948" y="2766370"/>
+            <a:ext cx="5394095" cy="923330"/>
+          </a:xfrm>
+          <a:prstGeom prst="rect">
+            <a:avLst/>
+          </a:prstGeom>
+          <a:noFill/>
+        </p:spPr>
+        <p:txBody>
+          <a:bodyPr wrap="square" lIns="91440" tIns="45720" rIns="91440" bIns="45720">
+            <a:spAutoFit/>
+          </a:bodyPr>
+          <a:lstStyle/>
+          <a:p>
+            <a:pPr algn="ctr"/>
+            <a:r>
+              <a:rPr lang="en-US" sz="5400" dirty="0">
+                <a:ln w="38100">
+                  <a:solidFill>
+                    <a:srgbClr val="4DA26B"/>
+                  </a:solidFill>
+                </a:ln>
+                <a:solidFill>
+                  <a:srgbClr val="2F874B"/>
+                </a:solidFill>
+                <a:effectLst>
+                  <a:outerShdw blurRad="38100" dist="25400" dir="5400000" algn="ctr" rotWithShape="0">
+                    <a:srgbClr val="6E747A">
+                      <a:alpha val="43000"/>
+                    </a:srgbClr>
+                  </a:outerShdw>
+                </a:effectLst>
+                <a:latin typeface="Aharoni" panose="02010803020104030203" pitchFamily="2" charset="-79"/>
+                <a:cs typeface="Aharoni" panose="02010803020104030203" pitchFamily="2" charset="-79"/>
+              </a:rPr>
+              <a:t>challenges</a:t>
+            </a:r>
+          </a:p>
+        </p:txBody>
+      </p:sp>
+    </p:spTree>
+    <p:extLst>
+      <p:ext uri="{BB962C8B-B14F-4D97-AF65-F5344CB8AC3E}">
+        <p14:creationId xmlns:p14="http://schemas.microsoft.com/office/powerpoint/2010/main" val="1115394691"/>
+      </p:ext>
+    </p:extLst>
+  </p:cSld>
+  <p:clrMapOvr>
+    <a:masterClrMapping/>
+  </p:clrMapOvr>
+</p:sld>
+</file>
+
+<file path=ppt/slides/slide6.xml><?xml version="1.0" encoding="utf-8"?>
 <p:sld xmlns:a="http://schemas.openxmlformats.org/drawingml/2006/main" xmlns:r="http://schemas.openxmlformats.org/officeDocument/2006/relationships" xmlns:p="http://schemas.openxmlformats.org/presentationml/2006/main">
   <p:cSld>
     <p:spTree>
@@ -5250,7 +6063,7 @@
 </p:sld>
 </file>
 
-<file path=ppt/slides/slide5.xml><?xml version="1.0" encoding="utf-8"?>
+<file path=ppt/slides/slide7.xml><?xml version="1.0" encoding="utf-8"?>
 <p:sld xmlns:a="http://schemas.openxmlformats.org/drawingml/2006/main" xmlns:r="http://schemas.openxmlformats.org/officeDocument/2006/relationships" xmlns:p="http://schemas.openxmlformats.org/presentationml/2006/main">
   <p:cSld>
     <p:spTree>
@@ -5350,7 +6163,7 @@
           <a:p>
             <a:fld id="{FADAFFCC-3068-47C7-A553-613C66E7752E}" type="datetime1">
               <a:rPr lang="en-US" smtClean="0"/>
-              <a:t>5/2/2018</a:t>
+              <a:t>5/3/2018</a:t>
             </a:fld>
             <a:endParaRPr lang="he-IL"/>
           </a:p>
@@ -6408,7 +7221,7 @@
 </p:sld>
 </file>
 
-<file path=ppt/slides/slide6.xml><?xml version="1.0" encoding="utf-8"?>
+<file path=ppt/slides/slide8.xml><?xml version="1.0" encoding="utf-8"?>
 <p:sld xmlns:a="http://schemas.openxmlformats.org/drawingml/2006/main" xmlns:r="http://schemas.openxmlformats.org/officeDocument/2006/relationships" xmlns:p="http://schemas.openxmlformats.org/presentationml/2006/main">
   <p:cSld>
     <p:spTree>
@@ -8718,461 +9531,7 @@
 </p:sld>
 </file>
 
-<file path=ppt/slides/slide7.xml><?xml version="1.0" encoding="utf-8"?>
-<p:sld xmlns:a="http://schemas.openxmlformats.org/drawingml/2006/main" xmlns:r="http://schemas.openxmlformats.org/officeDocument/2006/relationships" xmlns:p="http://schemas.openxmlformats.org/presentationml/2006/main">
-  <p:cSld>
-    <p:spTree>
-      <p:nvGrpSpPr>
-        <p:cNvPr id="1" name=""/>
-        <p:cNvGrpSpPr/>
-        <p:nvPr/>
-      </p:nvGrpSpPr>
-      <p:grpSpPr>
-        <a:xfrm>
-          <a:off x="0" y="0"/>
-          <a:ext cx="0" cy="0"/>
-          <a:chOff x="0" y="0"/>
-          <a:chExt cx="0" cy="0"/>
-        </a:xfrm>
-      </p:grpSpPr>
-      <p:sp>
-        <p:nvSpPr>
-          <p:cNvPr id="2" name="כותרת 1">
-            <a:extLst>
-              <a:ext uri="{FF2B5EF4-FFF2-40B4-BE49-F238E27FC236}">
-                <a16:creationId xmlns:a16="http://schemas.microsoft.com/office/drawing/2014/main" id="{0697D4F4-F50F-4B8B-8F8B-AAB9182CDCF8}"/>
-              </a:ext>
-            </a:extLst>
-          </p:cNvPr>
-          <p:cNvSpPr>
-            <a:spLocks noGrp="1"/>
-          </p:cNvSpPr>
-          <p:nvPr>
-            <p:ph type="title"/>
-          </p:nvPr>
-        </p:nvSpPr>
-        <p:spPr/>
-        <p:txBody>
-          <a:bodyPr vert="horz" lIns="91440" tIns="45720" rIns="91440" bIns="45720" rtlCol="1" anchor="ctr">
-            <a:normAutofit/>
-          </a:bodyPr>
-          <a:lstStyle/>
-          <a:p>
-            <a:pPr algn="ctr"/>
-            <a:r>
-              <a:rPr lang="en-US" dirty="0"/>
-              <a:t>DMBI Data Hackathon - timeline</a:t>
-            </a:r>
-            <a:endParaRPr lang="he-IL" dirty="0"/>
-          </a:p>
-        </p:txBody>
-      </p:sp>
-      <p:pic>
-        <p:nvPicPr>
-          <p:cNvPr id="6" name="Picture 5">
-            <a:extLst>
-              <a:ext uri="{FF2B5EF4-FFF2-40B4-BE49-F238E27FC236}">
-                <a16:creationId xmlns:a16="http://schemas.microsoft.com/office/drawing/2014/main" id="{F6C8768B-75C6-4862-BD41-955D3EED206B}"/>
-              </a:ext>
-            </a:extLst>
-          </p:cNvPr>
-          <p:cNvPicPr>
-            <a:picLocks noChangeAspect="1"/>
-          </p:cNvPicPr>
-          <p:nvPr/>
-        </p:nvPicPr>
-        <p:blipFill rotWithShape="1">
-          <a:blip r:embed="rId2">
-            <a:extLst>
-              <a:ext uri="{28A0092B-C50C-407E-A947-70E740481C1C}">
-                <a14:useLocalDpi xmlns:a14="http://schemas.microsoft.com/office/drawing/2010/main" val="0"/>
-              </a:ext>
-            </a:extLst>
-          </a:blip>
-          <a:srcRect/>
-          <a:stretch/>
-        </p:blipFill>
-        <p:spPr>
-          <a:xfrm>
-            <a:off x="193964" y="230188"/>
-            <a:ext cx="2105889" cy="1184563"/>
-          </a:xfrm>
-          <a:prstGeom prst="rect">
-            <a:avLst/>
-          </a:prstGeom>
-        </p:spPr>
-      </p:pic>
-      <p:pic>
-        <p:nvPicPr>
-          <p:cNvPr id="7" name="Picture 2" descr="Image result for bgu">
-            <a:extLst>
-              <a:ext uri="{FF2B5EF4-FFF2-40B4-BE49-F238E27FC236}">
-                <a16:creationId xmlns:a16="http://schemas.microsoft.com/office/drawing/2014/main" id="{90848CA4-C583-40E9-8976-C26F6CA508BB}"/>
-              </a:ext>
-            </a:extLst>
-          </p:cNvPr>
-          <p:cNvPicPr>
-            <a:picLocks noChangeAspect="1" noChangeArrowheads="1"/>
-          </p:cNvPicPr>
-          <p:nvPr/>
-        </p:nvPicPr>
-        <p:blipFill>
-          <a:blip r:embed="rId3" cstate="print">
-            <a:extLst>
-              <a:ext uri="{28A0092B-C50C-407E-A947-70E740481C1C}">
-                <a14:useLocalDpi xmlns:a14="http://schemas.microsoft.com/office/drawing/2010/main" val="0"/>
-              </a:ext>
-            </a:extLst>
-          </a:blip>
-          <a:srcRect/>
-          <a:stretch>
-            <a:fillRect/>
-          </a:stretch>
-        </p:blipFill>
-        <p:spPr bwMode="auto">
-          <a:xfrm>
-            <a:off x="10526685" y="86793"/>
-            <a:ext cx="1471351" cy="1471351"/>
-          </a:xfrm>
-          <a:prstGeom prst="rect">
-            <a:avLst/>
-          </a:prstGeom>
-          <a:noFill/>
-          <a:extLst>
-            <a:ext uri="{909E8E84-426E-40DD-AFC4-6F175D3DCCD1}">
-              <a14:hiddenFill xmlns:a14="http://schemas.microsoft.com/office/drawing/2010/main">
-                <a:solidFill>
-                  <a:srgbClr val="FFFFFF"/>
-                </a:solidFill>
-              </a14:hiddenFill>
-            </a:ext>
-          </a:extLst>
-        </p:spPr>
-      </p:pic>
-      <p:sp>
-        <p:nvSpPr>
-          <p:cNvPr id="5" name="Content Placeholder 4">
-            <a:extLst>
-              <a:ext uri="{FF2B5EF4-FFF2-40B4-BE49-F238E27FC236}">
-                <a16:creationId xmlns:a16="http://schemas.microsoft.com/office/drawing/2014/main" id="{E4C2BB1C-D729-48F2-B91A-CD3A1F94B173}"/>
-              </a:ext>
-            </a:extLst>
-          </p:cNvPr>
-          <p:cNvSpPr>
-            <a:spLocks noGrp="1"/>
-          </p:cNvSpPr>
-          <p:nvPr>
-            <p:ph idx="1"/>
-          </p:nvPr>
-        </p:nvSpPr>
-        <p:spPr>
-          <a:xfrm>
-            <a:off x="442785" y="1825625"/>
-            <a:ext cx="5397842" cy="4351338"/>
-          </a:xfrm>
-        </p:spPr>
-        <p:txBody>
-          <a:bodyPr>
-            <a:normAutofit lnSpcReduction="10000"/>
-          </a:bodyPr>
-          <a:lstStyle/>
-          <a:p>
-            <a:pPr algn="l" rtl="0" fontAlgn="base"/>
-            <a:r>
-              <a:rPr lang="en-US" sz="2000" b="1" dirty="0"/>
-              <a:t>Day 1, 3/5:</a:t>
-            </a:r>
-            <a:r>
-              <a:rPr lang="en-US" sz="2000" dirty="0"/>
-              <a:t> </a:t>
-            </a:r>
-          </a:p>
-          <a:p>
-            <a:pPr algn="l" rtl="0" fontAlgn="base"/>
-            <a:r>
-              <a:rPr lang="en-US" sz="2000" dirty="0"/>
-              <a:t>9:00 - Arrival and light breakfast</a:t>
-            </a:r>
-          </a:p>
-          <a:p>
-            <a:pPr algn="l" rtl="0" fontAlgn="base"/>
-            <a:r>
-              <a:rPr lang="en-US" sz="2000" dirty="0"/>
-              <a:t>9:45 - Hackathon starts! Challenges overview</a:t>
-            </a:r>
-          </a:p>
-          <a:p>
-            <a:pPr algn="l" rtl="0" fontAlgn="base"/>
-            <a:r>
-              <a:rPr lang="en-US" sz="2000" dirty="0"/>
-              <a:t>12:00 - Tutorial - "an Introductory Tutorial on Embeddings with TensorFlow" by </a:t>
-            </a:r>
-            <a:r>
-              <a:rPr lang="en-US" sz="2000" dirty="0">
-                <a:hlinkClick r:id="rId4"/>
-              </a:rPr>
-              <a:t>Taboola</a:t>
-            </a:r>
-            <a:endParaRPr lang="en-US" sz="2000" dirty="0"/>
-          </a:p>
-          <a:p>
-            <a:pPr algn="l" rtl="0" fontAlgn="base"/>
-            <a:r>
-              <a:rPr lang="en-US" sz="2000" dirty="0"/>
-              <a:t>14:00 - Lunch</a:t>
-            </a:r>
-          </a:p>
-          <a:p>
-            <a:pPr algn="l" rtl="0" fontAlgn="base"/>
-            <a:r>
-              <a:rPr lang="en-US" sz="2000" dirty="0"/>
-              <a:t>16:00 - Tutorial - "Advanced </a:t>
-            </a:r>
-            <a:r>
-              <a:rPr lang="en-US" sz="2000" dirty="0" err="1"/>
-              <a:t>Keras</a:t>
-            </a:r>
-            <a:r>
-              <a:rPr lang="en-US" sz="2000" dirty="0"/>
-              <a:t> Applications" by </a:t>
-            </a:r>
-            <a:r>
-              <a:rPr lang="en-US" sz="2000" dirty="0">
-                <a:hlinkClick r:id="rId4"/>
-              </a:rPr>
-              <a:t>Yam Peleg</a:t>
-            </a:r>
-            <a:endParaRPr lang="en-US" sz="2000" dirty="0"/>
-          </a:p>
-          <a:p>
-            <a:pPr algn="l" rtl="0" fontAlgn="base"/>
-            <a:r>
-              <a:rPr lang="en-US" sz="2000" dirty="0"/>
-              <a:t>19:00 - Tutorial -  "Interpretability of Machine Learning Models" by  </a:t>
-            </a:r>
-            <a:r>
-              <a:rPr lang="en-US" sz="2000" dirty="0">
-                <a:hlinkClick r:id="rId4"/>
-              </a:rPr>
-              <a:t>Michaël </a:t>
-            </a:r>
-            <a:r>
-              <a:rPr lang="en-US" sz="2000" dirty="0" err="1">
-                <a:hlinkClick r:id="rId4"/>
-              </a:rPr>
-              <a:t>Mariën</a:t>
-            </a:r>
-            <a:r>
-              <a:rPr lang="en-US" sz="2000" dirty="0"/>
-              <a:t> from KBC</a:t>
-            </a:r>
-          </a:p>
-          <a:p>
-            <a:pPr algn="l" rtl="0" fontAlgn="base"/>
-            <a:r>
-              <a:rPr lang="en-US" sz="2000" dirty="0"/>
-              <a:t>20:30 - Dinner</a:t>
-            </a:r>
-          </a:p>
-          <a:p>
-            <a:pPr algn="l" rtl="0" fontAlgn="base"/>
-            <a:r>
-              <a:rPr lang="en-US" sz="2000" dirty="0"/>
-              <a:t>21:30 - Stretches and Body Relaxation</a:t>
-            </a:r>
-          </a:p>
-          <a:p>
-            <a:pPr marL="0" indent="0" algn="l" rtl="0" fontAlgn="base">
-              <a:buNone/>
-            </a:pPr>
-            <a:endParaRPr lang="en-US" sz="2000" dirty="0"/>
-          </a:p>
-        </p:txBody>
-      </p:sp>
-      <p:sp>
-        <p:nvSpPr>
-          <p:cNvPr id="8" name="Rectangle 7">
-            <a:extLst>
-              <a:ext uri="{FF2B5EF4-FFF2-40B4-BE49-F238E27FC236}">
-                <a16:creationId xmlns:a16="http://schemas.microsoft.com/office/drawing/2014/main" id="{A88DC748-F668-4AFA-BD7B-6B26A14DA3E1}"/>
-              </a:ext>
-            </a:extLst>
-          </p:cNvPr>
-          <p:cNvSpPr/>
-          <p:nvPr/>
-        </p:nvSpPr>
-        <p:spPr>
-          <a:xfrm>
-            <a:off x="6433751" y="1825625"/>
-            <a:ext cx="6096000" cy="2308324"/>
-          </a:xfrm>
-          <a:prstGeom prst="rect">
-            <a:avLst/>
-          </a:prstGeom>
-        </p:spPr>
-        <p:txBody>
-          <a:bodyPr>
-            <a:spAutoFit/>
-          </a:bodyPr>
-          <a:lstStyle/>
-          <a:p>
-            <a:pPr algn="l" rtl="0" fontAlgn="base"/>
-            <a:r>
-              <a:rPr lang="en-US" b="1" dirty="0"/>
-              <a:t>Day 2, 4/5:</a:t>
-            </a:r>
-            <a:endParaRPr lang="en-US" dirty="0"/>
-          </a:p>
-          <a:p>
-            <a:pPr algn="l" rtl="0" fontAlgn="base"/>
-            <a:r>
-              <a:rPr lang="en-US" dirty="0"/>
-              <a:t>00:00 - Night snacks</a:t>
-            </a:r>
-          </a:p>
-          <a:p>
-            <a:pPr algn="l" rtl="0" fontAlgn="base"/>
-            <a:r>
-              <a:rPr lang="en-US" dirty="0"/>
-              <a:t>6:30 - Test sets are given</a:t>
-            </a:r>
-          </a:p>
-          <a:p>
-            <a:pPr algn="l" rtl="0" fontAlgn="base"/>
-            <a:r>
-              <a:rPr lang="en-US" dirty="0"/>
-              <a:t>7:00 - Breakfast</a:t>
-            </a:r>
-          </a:p>
-          <a:p>
-            <a:pPr algn="l" rtl="0" fontAlgn="base"/>
-            <a:r>
-              <a:rPr lang="en-US" dirty="0"/>
-              <a:t>9:00 - First judging round</a:t>
-            </a:r>
-          </a:p>
-          <a:p>
-            <a:pPr algn="l" rtl="0" fontAlgn="base"/>
-            <a:r>
-              <a:rPr lang="en-US" dirty="0"/>
-              <a:t>11:30 - Presentation and second judging round</a:t>
-            </a:r>
-          </a:p>
-          <a:p>
-            <a:pPr algn="l" rtl="0" fontAlgn="base"/>
-            <a:r>
-              <a:rPr lang="en-US" dirty="0"/>
-              <a:t>12:30 – winners announced </a:t>
-            </a:r>
-          </a:p>
-          <a:p>
-            <a:pPr algn="l" rtl="0" fontAlgn="base"/>
-            <a:r>
-              <a:rPr lang="en-US" dirty="0"/>
-              <a:t>13:00 - Hackathon ends!</a:t>
-            </a:r>
-          </a:p>
-        </p:txBody>
-      </p:sp>
-      <p:sp>
-        <p:nvSpPr>
-          <p:cNvPr id="12" name="Rectangle 11">
-            <a:extLst>
-              <a:ext uri="{FF2B5EF4-FFF2-40B4-BE49-F238E27FC236}">
-                <a16:creationId xmlns:a16="http://schemas.microsoft.com/office/drawing/2014/main" id="{7CB913EE-D151-4A9A-9025-BBCAB9F2583B}"/>
-              </a:ext>
-            </a:extLst>
-          </p:cNvPr>
-          <p:cNvSpPr/>
-          <p:nvPr/>
-        </p:nvSpPr>
-        <p:spPr>
-          <a:xfrm>
-            <a:off x="6433751" y="4259203"/>
-            <a:ext cx="5198076" cy="2308324"/>
-          </a:xfrm>
-          <a:prstGeom prst="rect">
-            <a:avLst/>
-          </a:prstGeom>
-        </p:spPr>
-        <p:txBody>
-          <a:bodyPr wrap="square">
-            <a:spAutoFit/>
-          </a:bodyPr>
-          <a:lstStyle/>
-          <a:p>
-            <a:pPr algn="l" rtl="0" fontAlgn="base"/>
-            <a:r>
-              <a:rPr lang="en-US" b="1" dirty="0"/>
-              <a:t>Things to remember:</a:t>
-            </a:r>
-          </a:p>
-          <a:p>
-            <a:pPr marL="285750" indent="-285750" algn="l" rtl="0" fontAlgn="base">
-              <a:buFont typeface="Arial" panose="020B0604020202020204" pitchFamily="34" charset="0"/>
-              <a:buChar char="•"/>
-            </a:pPr>
-            <a:r>
-              <a:rPr lang="en-US" dirty="0"/>
-              <a:t>Prepare a presentation that describes your work for judging rounds</a:t>
-            </a:r>
-          </a:p>
-          <a:p>
-            <a:pPr marL="285750" indent="-285750" algn="l" rtl="0" fontAlgn="base">
-              <a:buFont typeface="Arial" panose="020B0604020202020204" pitchFamily="34" charset="0"/>
-              <a:buChar char="•"/>
-            </a:pPr>
-            <a:r>
-              <a:rPr lang="en-US" dirty="0"/>
-              <a:t>Solutions are scored:</a:t>
-            </a:r>
-          </a:p>
-          <a:p>
-            <a:pPr marL="742950" lvl="1" indent="-285750" algn="l" rtl="0" fontAlgn="base">
-              <a:buFont typeface="Wingdings" panose="05000000000000000000" pitchFamily="2" charset="2"/>
-              <a:buChar char="§"/>
-            </a:pPr>
-            <a:r>
-              <a:rPr lang="en-US" dirty="0"/>
-              <a:t>60% metric optimization</a:t>
-            </a:r>
-          </a:p>
-          <a:p>
-            <a:pPr marL="742950" lvl="1" indent="-285750" algn="l" rtl="0" fontAlgn="base">
-              <a:buFont typeface="Wingdings" panose="05000000000000000000" pitchFamily="2" charset="2"/>
-              <a:buChar char="§"/>
-            </a:pPr>
-            <a:r>
-              <a:rPr lang="en-US" dirty="0"/>
-              <a:t>30% creativity and innovation</a:t>
-            </a:r>
-          </a:p>
-          <a:p>
-            <a:pPr marL="742950" lvl="1" indent="-285750" algn="l" rtl="0" fontAlgn="base">
-              <a:buFont typeface="Wingdings" panose="05000000000000000000" pitchFamily="2" charset="2"/>
-              <a:buChar char="§"/>
-            </a:pPr>
-            <a:r>
-              <a:rPr lang="en-US" dirty="0"/>
-              <a:t>10% special insights to the data (even if not effecting selected metric)</a:t>
-            </a:r>
-          </a:p>
-        </p:txBody>
-      </p:sp>
-    </p:spTree>
-    <p:extLst>
-      <p:ext uri="{BB962C8B-B14F-4D97-AF65-F5344CB8AC3E}">
-        <p14:creationId xmlns:p14="http://schemas.microsoft.com/office/powerpoint/2010/main" val="1809144969"/>
-      </p:ext>
-    </p:extLst>
-  </p:cSld>
-  <p:clrMapOvr>
-    <a:masterClrMapping/>
-  </p:clrMapOvr>
-</p:sld>
-</file>
-
-<file path=ppt/slides/slide8.xml><?xml version="1.0" encoding="utf-8"?>
+<file path=ppt/slides/slide9.xml><?xml version="1.0" encoding="utf-8"?>
 <p:sld xmlns:a="http://schemas.openxmlformats.org/drawingml/2006/main" xmlns:r="http://schemas.openxmlformats.org/officeDocument/2006/relationships" xmlns:p="http://schemas.openxmlformats.org/presentationml/2006/main">
   <p:cSld>
     <p:spTree>
@@ -9543,210 +9902,6 @@
     <p:extLst>
       <p:ext uri="{BB962C8B-B14F-4D97-AF65-F5344CB8AC3E}">
         <p14:creationId xmlns:p14="http://schemas.microsoft.com/office/powerpoint/2010/main" val="2933794616"/>
-      </p:ext>
-    </p:extLst>
-  </p:cSld>
-  <p:clrMapOvr>
-    <a:masterClrMapping/>
-  </p:clrMapOvr>
-</p:sld>
-</file>
-
-<file path=ppt/slides/slide9.xml><?xml version="1.0" encoding="utf-8"?>
-<p:sld xmlns:a="http://schemas.openxmlformats.org/drawingml/2006/main" xmlns:r="http://schemas.openxmlformats.org/officeDocument/2006/relationships" xmlns:p="http://schemas.openxmlformats.org/presentationml/2006/main">
-  <p:cSld>
-    <p:spTree>
-      <p:nvGrpSpPr>
-        <p:cNvPr id="1" name=""/>
-        <p:cNvGrpSpPr/>
-        <p:nvPr/>
-      </p:nvGrpSpPr>
-      <p:grpSpPr>
-        <a:xfrm>
-          <a:off x="0" y="0"/>
-          <a:ext cx="0" cy="0"/>
-          <a:chOff x="0" y="0"/>
-          <a:chExt cx="0" cy="0"/>
-        </a:xfrm>
-      </p:grpSpPr>
-      <p:pic>
-        <p:nvPicPr>
-          <p:cNvPr id="6" name="Picture 5">
-            <a:extLst>
-              <a:ext uri="{FF2B5EF4-FFF2-40B4-BE49-F238E27FC236}">
-                <a16:creationId xmlns:a16="http://schemas.microsoft.com/office/drawing/2014/main" id="{8D17072E-C2E3-49A0-95DC-51200ABA6C8B}"/>
-              </a:ext>
-            </a:extLst>
-          </p:cNvPr>
-          <p:cNvPicPr>
-            <a:picLocks noChangeAspect="1"/>
-          </p:cNvPicPr>
-          <p:nvPr/>
-        </p:nvPicPr>
-        <p:blipFill rotWithShape="1">
-          <a:blip r:embed="rId2">
-            <a:extLst>
-              <a:ext uri="{28A0092B-C50C-407E-A947-70E740481C1C}">
-                <a14:useLocalDpi xmlns:a14="http://schemas.microsoft.com/office/drawing/2010/main" val="0"/>
-              </a:ext>
-            </a:extLst>
-          </a:blip>
-          <a:srcRect l="11896" r="16132"/>
-          <a:stretch/>
-        </p:blipFill>
-        <p:spPr>
-          <a:xfrm>
-            <a:off x="280086" y="181046"/>
-            <a:ext cx="3307923" cy="2585324"/>
-          </a:xfrm>
-          <a:prstGeom prst="rect">
-            <a:avLst/>
-          </a:prstGeom>
-        </p:spPr>
-      </p:pic>
-      <p:pic>
-        <p:nvPicPr>
-          <p:cNvPr id="3" name="Picture 2">
-            <a:extLst>
-              <a:ext uri="{FF2B5EF4-FFF2-40B4-BE49-F238E27FC236}">
-                <a16:creationId xmlns:a16="http://schemas.microsoft.com/office/drawing/2014/main" id="{E343B223-CBCB-45BB-816A-C742A11D364A}"/>
-              </a:ext>
-            </a:extLst>
-          </p:cNvPr>
-          <p:cNvPicPr>
-            <a:picLocks noChangeAspect="1"/>
-          </p:cNvPicPr>
-          <p:nvPr/>
-        </p:nvPicPr>
-        <p:blipFill rotWithShape="1">
-          <a:blip r:embed="rId2">
-            <a:extLst>
-              <a:ext uri="{28A0092B-C50C-407E-A947-70E740481C1C}">
-                <a14:useLocalDpi xmlns:a14="http://schemas.microsoft.com/office/drawing/2010/main" val="0"/>
-              </a:ext>
-            </a:extLst>
-          </a:blip>
-          <a:srcRect l="11227" r="15463"/>
-          <a:stretch/>
-        </p:blipFill>
-        <p:spPr>
-          <a:xfrm>
-            <a:off x="8641492" y="3980936"/>
-            <a:ext cx="3369434" cy="2585324"/>
-          </a:xfrm>
-          <a:prstGeom prst="rect">
-            <a:avLst/>
-          </a:prstGeom>
-        </p:spPr>
-      </p:pic>
-      <p:sp>
-        <p:nvSpPr>
-          <p:cNvPr id="2" name="Rectangle 1">
-            <a:extLst>
-              <a:ext uri="{FF2B5EF4-FFF2-40B4-BE49-F238E27FC236}">
-                <a16:creationId xmlns:a16="http://schemas.microsoft.com/office/drawing/2014/main" id="{97300321-B191-48FF-BC00-681AD5552B4A}"/>
-              </a:ext>
-            </a:extLst>
-          </p:cNvPr>
-          <p:cNvSpPr/>
-          <p:nvPr/>
-        </p:nvSpPr>
-        <p:spPr>
-          <a:xfrm>
-            <a:off x="3684002" y="2004532"/>
-            <a:ext cx="5394095" cy="2585323"/>
-          </a:xfrm>
-          <a:prstGeom prst="rect">
-            <a:avLst/>
-          </a:prstGeom>
-          <a:noFill/>
-        </p:spPr>
-        <p:txBody>
-          <a:bodyPr wrap="square" lIns="91440" tIns="45720" rIns="91440" bIns="45720">
-            <a:spAutoFit/>
-          </a:bodyPr>
-          <a:lstStyle/>
-          <a:p>
-            <a:pPr algn="ctr"/>
-            <a:r>
-              <a:rPr lang="en-US" sz="5400" dirty="0">
-                <a:ln w="38100">
-                  <a:solidFill>
-                    <a:srgbClr val="4DA26B"/>
-                  </a:solidFill>
-                </a:ln>
-                <a:solidFill>
-                  <a:srgbClr val="2F874B"/>
-                </a:solidFill>
-                <a:effectLst>
-                  <a:outerShdw blurRad="38100" dist="25400" dir="5400000" algn="ctr" rotWithShape="0">
-                    <a:srgbClr val="6E747A">
-                      <a:alpha val="43000"/>
-                    </a:srgbClr>
-                  </a:outerShdw>
-                </a:effectLst>
-                <a:latin typeface="Aharoni" panose="02010803020104030203" pitchFamily="2" charset="-79"/>
-                <a:cs typeface="Aharoni" panose="02010803020104030203" pitchFamily="2" charset="-79"/>
-              </a:rPr>
-              <a:t>Good luck</a:t>
-            </a:r>
-          </a:p>
-          <a:p>
-            <a:pPr algn="ctr"/>
-            <a:r>
-              <a:rPr lang="en-US" sz="5400" dirty="0">
-                <a:ln w="38100">
-                  <a:solidFill>
-                    <a:srgbClr val="4DA26B"/>
-                  </a:solidFill>
-                </a:ln>
-                <a:solidFill>
-                  <a:srgbClr val="2F874B"/>
-                </a:solidFill>
-                <a:effectLst>
-                  <a:outerShdw blurRad="38100" dist="25400" dir="5400000" algn="ctr" rotWithShape="0">
-                    <a:srgbClr val="6E747A">
-                      <a:alpha val="43000"/>
-                    </a:srgbClr>
-                  </a:outerShdw>
-                </a:effectLst>
-                <a:latin typeface="Aharoni" panose="02010803020104030203" pitchFamily="2" charset="-79"/>
-                <a:cs typeface="Aharoni" panose="02010803020104030203" pitchFamily="2" charset="-79"/>
-              </a:rPr>
-              <a:t>&amp; </a:t>
-            </a:r>
-          </a:p>
-          <a:p>
-            <a:pPr algn="ctr"/>
-            <a:r>
-              <a:rPr lang="en-US" sz="5400" dirty="0">
-                <a:ln w="38100">
-                  <a:solidFill>
-                    <a:srgbClr val="4DA26B"/>
-                  </a:solidFill>
-                </a:ln>
-                <a:solidFill>
-                  <a:srgbClr val="2F874B"/>
-                </a:solidFill>
-                <a:effectLst>
-                  <a:outerShdw blurRad="38100" dist="25400" dir="5400000" algn="ctr" rotWithShape="0">
-                    <a:srgbClr val="6E747A">
-                      <a:alpha val="43000"/>
-                    </a:srgbClr>
-                  </a:outerShdw>
-                </a:effectLst>
-                <a:latin typeface="Aharoni" panose="02010803020104030203" pitchFamily="2" charset="-79"/>
-                <a:cs typeface="Aharoni" panose="02010803020104030203" pitchFamily="2" charset="-79"/>
-              </a:rPr>
-              <a:t>have fun!</a:t>
-            </a:r>
-          </a:p>
-        </p:txBody>
-      </p:sp>
-    </p:spTree>
-    <p:extLst>
-      <p:ext uri="{BB962C8B-B14F-4D97-AF65-F5344CB8AC3E}">
-        <p14:creationId xmlns:p14="http://schemas.microsoft.com/office/powerpoint/2010/main" val="2702283830"/>
       </p:ext>
     </p:extLst>
   </p:cSld>

</xml_diff>